<commit_message>
5 rounds of training - average out instability of SB-3 algos
</commit_message>
<xml_diff>
--- a/artefacts/presentation/Presentation_Empirical_Study_V.2.9_19-Jun-2023.pptx
+++ b/artefacts/presentation/Presentation_Empirical_Study_V.2.9_19-Jun-2023.pptx
@@ -21,13 +21,14 @@
     <p:sldId id="278" r:id="rId15"/>
     <p:sldId id="283" r:id="rId16"/>
     <p:sldId id="286" r:id="rId17"/>
-    <p:sldId id="281" r:id="rId18"/>
-    <p:sldId id="288" r:id="rId19"/>
-    <p:sldId id="287" r:id="rId20"/>
-    <p:sldId id="293" r:id="rId21"/>
-    <p:sldId id="295" r:id="rId22"/>
-    <p:sldId id="280" r:id="rId23"/>
-    <p:sldId id="291" r:id="rId24"/>
+    <p:sldId id="296" r:id="rId18"/>
+    <p:sldId id="281" r:id="rId19"/>
+    <p:sldId id="288" r:id="rId20"/>
+    <p:sldId id="287" r:id="rId21"/>
+    <p:sldId id="293" r:id="rId22"/>
+    <p:sldId id="295" r:id="rId23"/>
+    <p:sldId id="280" r:id="rId24"/>
+    <p:sldId id="291" r:id="rId25"/>
   </p:sldIdLst>
   <p:sldSz cx="12192000" cy="6858000"/>
   <p:notesSz cx="6858000" cy="9144000"/>
@@ -129,7 +130,7 @@
   <p:extLst>
     <p:ext uri="{EFAFB233-063F-42B5-8137-9DF3F51BA10A}">
       <p15:sldGuideLst xmlns:p15="http://schemas.microsoft.com/office/powerpoint/2012/main">
-        <p15:guide id="1" orient="horz" pos="768" userDrawn="1">
+        <p15:guide id="1" orient="horz" pos="528" userDrawn="1">
           <p15:clr>
             <a:srgbClr val="A4A3A4"/>
           </p15:clr>
@@ -313,7 +314,7 @@
           <a:p>
             <a:fld id="{36492983-0996-449E-A9A9-7CED4365AED0}" type="datetimeFigureOut">
               <a:rPr lang="en-US" smtClean="0"/>
-              <a:t>6/19/2023</a:t>
+              <a:t>6/20/2023</a:t>
             </a:fld>
             <a:endParaRPr lang="en-US"/>
           </a:p>
@@ -541,7 +542,7 @@
           <a:p>
             <a:fld id="{36492983-0996-449E-A9A9-7CED4365AED0}" type="datetimeFigureOut">
               <a:rPr lang="en-US" smtClean="0"/>
-              <a:t>6/19/2023</a:t>
+              <a:t>6/20/2023</a:t>
             </a:fld>
             <a:endParaRPr lang="en-US"/>
           </a:p>
@@ -721,7 +722,7 @@
           <a:p>
             <a:fld id="{36492983-0996-449E-A9A9-7CED4365AED0}" type="datetimeFigureOut">
               <a:rPr lang="en-US" smtClean="0"/>
-              <a:t>6/19/2023</a:t>
+              <a:t>6/20/2023</a:t>
             </a:fld>
             <a:endParaRPr lang="en-US"/>
           </a:p>
@@ -891,7 +892,7 @@
           <a:p>
             <a:fld id="{36492983-0996-449E-A9A9-7CED4365AED0}" type="datetimeFigureOut">
               <a:rPr lang="en-US" smtClean="0"/>
-              <a:t>6/19/2023</a:t>
+              <a:t>6/20/2023</a:t>
             </a:fld>
             <a:endParaRPr lang="en-US"/>
           </a:p>
@@ -1145,7 +1146,7 @@
           <a:p>
             <a:fld id="{36492983-0996-449E-A9A9-7CED4365AED0}" type="datetimeFigureOut">
               <a:rPr lang="en-US" smtClean="0"/>
-              <a:t>6/19/2023</a:t>
+              <a:t>6/20/2023</a:t>
             </a:fld>
             <a:endParaRPr lang="en-US"/>
           </a:p>
@@ -1471,7 +1472,7 @@
           <a:p>
             <a:fld id="{36492983-0996-449E-A9A9-7CED4365AED0}" type="datetimeFigureOut">
               <a:rPr lang="en-US" smtClean="0"/>
-              <a:t>6/19/2023</a:t>
+              <a:t>6/20/2023</a:t>
             </a:fld>
             <a:endParaRPr lang="en-US"/>
           </a:p>
@@ -1922,7 +1923,7 @@
           <a:p>
             <a:fld id="{36492983-0996-449E-A9A9-7CED4365AED0}" type="datetimeFigureOut">
               <a:rPr lang="en-US" smtClean="0"/>
-              <a:t>6/19/2023</a:t>
+              <a:t>6/20/2023</a:t>
             </a:fld>
             <a:endParaRPr lang="en-US"/>
           </a:p>
@@ -2040,7 +2041,7 @@
           <a:p>
             <a:fld id="{36492983-0996-449E-A9A9-7CED4365AED0}" type="datetimeFigureOut">
               <a:rPr lang="en-US" smtClean="0"/>
-              <a:t>6/19/2023</a:t>
+              <a:t>6/20/2023</a:t>
             </a:fld>
             <a:endParaRPr lang="en-US"/>
           </a:p>
@@ -2135,7 +2136,7 @@
           <a:p>
             <a:fld id="{36492983-0996-449E-A9A9-7CED4365AED0}" type="datetimeFigureOut">
               <a:rPr lang="en-US" smtClean="0"/>
-              <a:t>6/19/2023</a:t>
+              <a:t>6/20/2023</a:t>
             </a:fld>
             <a:endParaRPr lang="en-US"/>
           </a:p>
@@ -2422,7 +2423,7 @@
           <a:p>
             <a:fld id="{36492983-0996-449E-A9A9-7CED4365AED0}" type="datetimeFigureOut">
               <a:rPr lang="en-US" smtClean="0"/>
-              <a:t>6/19/2023</a:t>
+              <a:t>6/20/2023</a:t>
             </a:fld>
             <a:endParaRPr lang="en-US"/>
           </a:p>
@@ -2744,7 +2745,7 @@
           <a:p>
             <a:fld id="{36492983-0996-449E-A9A9-7CED4365AED0}" type="datetimeFigureOut">
               <a:rPr lang="en-US" smtClean="0"/>
-              <a:t>6/19/2023</a:t>
+              <a:t>6/20/2023</a:t>
             </a:fld>
             <a:endParaRPr lang="en-US"/>
           </a:p>
@@ -2998,7 +2999,7 @@
           <a:p>
             <a:fld id="{36492983-0996-449E-A9A9-7CED4365AED0}" type="datetimeFigureOut">
               <a:rPr lang="en-US" smtClean="0"/>
-              <a:t>6/19/2023</a:t>
+              <a:t>6/20/2023</a:t>
             </a:fld>
             <a:endParaRPr lang="en-US"/>
           </a:p>
@@ -11041,6 +11042,427 @@
               </a:lnSpc>
             </a:pPr>
             <a:r>
+              <a:rPr lang="en-US" sz="3200" dirty="0">
+                <a:latin typeface="Segoe UI" panose="020B0502040204020203" pitchFamily="34" charset="0"/>
+                <a:cs typeface="Segoe UI" panose="020B0502040204020203" pitchFamily="34" charset="0"/>
+              </a:rPr>
+              <a:t>Sample test plots for algorithms</a:t>
+            </a:r>
+          </a:p>
+        </p:txBody>
+      </p:sp>
+      <p:sp>
+        <p:nvSpPr>
+          <p:cNvPr id="21" name="Rectangle 20">
+            <a:extLst>
+              <a:ext uri="{FF2B5EF4-FFF2-40B4-BE49-F238E27FC236}">
+                <a16:creationId xmlns:a16="http://schemas.microsoft.com/office/drawing/2014/main" id="{3B92CCBF-1641-4D35-9B74-6E4981730FF5}"/>
+              </a:ext>
+              <a:ext uri="{C183D7F6-B498-43B3-948B-1728B52AA6E4}">
+                <adec:decorative xmlns:adec="http://schemas.microsoft.com/office/drawing/2017/decorative" val="1"/>
+              </a:ext>
+            </a:extLst>
+          </p:cNvPr>
+          <p:cNvSpPr>
+            <a:spLocks noGrp="1" noRot="1" noChangeAspect="1" noMove="1" noResize="1" noEditPoints="1" noAdjustHandles="1" noChangeArrowheads="1" noChangeShapeType="1" noTextEdit="1"/>
+          </p:cNvSpPr>
+          <p:nvPr>
+            <p:extLst>
+              <p:ext uri="{386F3935-93C4-4BCD-93E2-E3B085C9AB24}">
+                <p16:designElem xmlns:p16="http://schemas.microsoft.com/office/powerpoint/2015/main" val="1"/>
+              </p:ext>
+            </p:extLst>
+          </p:nvPr>
+        </p:nvSpPr>
+        <p:spPr>
+          <a:xfrm>
+            <a:off x="0" y="0"/>
+            <a:ext cx="457200" cy="6858000"/>
+          </a:xfrm>
+          <a:prstGeom prst="rect">
+            <a:avLst/>
+          </a:prstGeom>
+          <a:solidFill>
+            <a:schemeClr val="accent1"/>
+          </a:solidFill>
+          <a:ln>
+            <a:noFill/>
+          </a:ln>
+        </p:spPr>
+        <p:style>
+          <a:lnRef idx="2">
+            <a:schemeClr val="accent1">
+              <a:shade val="50000"/>
+            </a:schemeClr>
+          </a:lnRef>
+          <a:fillRef idx="1">
+            <a:schemeClr val="accent1"/>
+          </a:fillRef>
+          <a:effectRef idx="0">
+            <a:schemeClr val="accent1"/>
+          </a:effectRef>
+          <a:fontRef idx="minor">
+            <a:schemeClr val="lt1"/>
+          </a:fontRef>
+        </p:style>
+      </p:sp>
+      <p:sp>
+        <p:nvSpPr>
+          <p:cNvPr id="10" name="TextBox 9">
+            <a:extLst>
+              <a:ext uri="{FF2B5EF4-FFF2-40B4-BE49-F238E27FC236}">
+                <a16:creationId xmlns:a16="http://schemas.microsoft.com/office/drawing/2014/main" id="{96269A52-B9DD-9207-9340-EDD8C2F749BC}"/>
+              </a:ext>
+            </a:extLst>
+          </p:cNvPr>
+          <p:cNvSpPr txBox="1"/>
+          <p:nvPr/>
+        </p:nvSpPr>
+        <p:spPr>
+          <a:xfrm>
+            <a:off x="578975" y="871622"/>
+            <a:ext cx="10932210" cy="456215"/>
+          </a:xfrm>
+          <a:prstGeom prst="rect">
+            <a:avLst/>
+          </a:prstGeom>
+          <a:noFill/>
+        </p:spPr>
+        <p:txBody>
+          <a:bodyPr wrap="square">
+            <a:spAutoFit/>
+          </a:bodyPr>
+          <a:lstStyle/>
+          <a:p>
+            <a:pPr>
+              <a:lnSpc>
+                <a:spcPct val="150000"/>
+              </a:lnSpc>
+            </a:pPr>
+            <a:r>
+              <a:rPr lang="en-US" dirty="0">
+                <a:latin typeface="Segoe UI" panose="020B0502040204020203" pitchFamily="34" charset="0"/>
+                <a:cs typeface="Segoe UI" panose="020B0502040204020203" pitchFamily="34" charset="0"/>
+              </a:rPr>
+              <a:t>PHM C-04 data-set: </a:t>
+            </a:r>
+            <a:r>
+              <a:rPr lang="en-US" sz="1600" dirty="0">
+                <a:latin typeface="Segoe UI" panose="020B0502040204020203" pitchFamily="34" charset="0"/>
+                <a:cs typeface="Segoe UI" panose="020B0502040204020203" pitchFamily="34" charset="0"/>
+              </a:rPr>
+              <a:t>Variant: Multi-variant state with no noise or break-down chance</a:t>
+            </a:r>
+          </a:p>
+        </p:txBody>
+      </p:sp>
+      <p:pic>
+        <p:nvPicPr>
+          <p:cNvPr id="5" name="Picture 4">
+            <a:extLst>
+              <a:ext uri="{FF2B5EF4-FFF2-40B4-BE49-F238E27FC236}">
+                <a16:creationId xmlns:a16="http://schemas.microsoft.com/office/drawing/2014/main" id="{9AE043A2-5A03-C77D-9707-1C253A74AE90}"/>
+              </a:ext>
+            </a:extLst>
+          </p:cNvPr>
+          <p:cNvPicPr>
+            <a:picLocks noChangeAspect="1"/>
+          </p:cNvPicPr>
+          <p:nvPr/>
+        </p:nvPicPr>
+        <p:blipFill>
+          <a:blip r:embed="rId2"/>
+          <a:stretch>
+            <a:fillRect/>
+          </a:stretch>
+        </p:blipFill>
+        <p:spPr>
+          <a:xfrm>
+            <a:off x="578975" y="1341653"/>
+            <a:ext cx="4602625" cy="2562597"/>
+          </a:xfrm>
+          <a:prstGeom prst="rect">
+            <a:avLst/>
+          </a:prstGeom>
+        </p:spPr>
+      </p:pic>
+      <p:pic>
+        <p:nvPicPr>
+          <p:cNvPr id="6" name="Picture 5">
+            <a:extLst>
+              <a:ext uri="{FF2B5EF4-FFF2-40B4-BE49-F238E27FC236}">
+                <a16:creationId xmlns:a16="http://schemas.microsoft.com/office/drawing/2014/main" id="{C2CEAFF4-02A4-C8FA-AF08-6CD0756DD5C5}"/>
+              </a:ext>
+            </a:extLst>
+          </p:cNvPr>
+          <p:cNvPicPr>
+            <a:picLocks noChangeAspect="1"/>
+          </p:cNvPicPr>
+          <p:nvPr/>
+        </p:nvPicPr>
+        <p:blipFill>
+          <a:blip r:embed="rId3"/>
+          <a:stretch>
+            <a:fillRect/>
+          </a:stretch>
+        </p:blipFill>
+        <p:spPr>
+          <a:xfrm>
+            <a:off x="578975" y="3980891"/>
+            <a:ext cx="4602625" cy="2562596"/>
+          </a:xfrm>
+          <a:prstGeom prst="rect">
+            <a:avLst/>
+          </a:prstGeom>
+        </p:spPr>
+      </p:pic>
+      <p:pic>
+        <p:nvPicPr>
+          <p:cNvPr id="7" name="Picture 6">
+            <a:extLst>
+              <a:ext uri="{FF2B5EF4-FFF2-40B4-BE49-F238E27FC236}">
+                <a16:creationId xmlns:a16="http://schemas.microsoft.com/office/drawing/2014/main" id="{69CFB5A1-1191-046D-38CE-8389E1862044}"/>
+              </a:ext>
+            </a:extLst>
+          </p:cNvPr>
+          <p:cNvPicPr>
+            <a:picLocks noChangeAspect="1"/>
+          </p:cNvPicPr>
+          <p:nvPr/>
+        </p:nvPicPr>
+        <p:blipFill>
+          <a:blip r:embed="rId4"/>
+          <a:stretch>
+            <a:fillRect/>
+          </a:stretch>
+        </p:blipFill>
+        <p:spPr>
+          <a:xfrm>
+            <a:off x="5303375" y="1341653"/>
+            <a:ext cx="4602625" cy="2562596"/>
+          </a:xfrm>
+          <a:prstGeom prst="rect">
+            <a:avLst/>
+          </a:prstGeom>
+        </p:spPr>
+      </p:pic>
+      <p:pic>
+        <p:nvPicPr>
+          <p:cNvPr id="14" name="Picture 13">
+            <a:extLst>
+              <a:ext uri="{FF2B5EF4-FFF2-40B4-BE49-F238E27FC236}">
+                <a16:creationId xmlns:a16="http://schemas.microsoft.com/office/drawing/2014/main" id="{4927C1D6-4087-DBA4-CD41-7ED5A055EAA4}"/>
+              </a:ext>
+            </a:extLst>
+          </p:cNvPr>
+          <p:cNvPicPr>
+            <a:picLocks noChangeAspect="1"/>
+          </p:cNvPicPr>
+          <p:nvPr/>
+        </p:nvPicPr>
+        <p:blipFill>
+          <a:blip r:embed="rId5"/>
+          <a:stretch>
+            <a:fillRect/>
+          </a:stretch>
+        </p:blipFill>
+        <p:spPr>
+          <a:xfrm>
+            <a:off x="5303374" y="3980890"/>
+            <a:ext cx="4602626" cy="2562597"/>
+          </a:xfrm>
+          <a:prstGeom prst="rect">
+            <a:avLst/>
+          </a:prstGeom>
+        </p:spPr>
+      </p:pic>
+    </p:spTree>
+    <p:extLst>
+      <p:ext uri="{BB962C8B-B14F-4D97-AF65-F5344CB8AC3E}">
+        <p14:creationId xmlns:p14="http://schemas.microsoft.com/office/powerpoint/2010/main" val="744317284"/>
+      </p:ext>
+    </p:extLst>
+  </p:cSld>
+  <p:clrMapOvr>
+    <a:masterClrMapping/>
+  </p:clrMapOvr>
+</p:sld>
+</file>
+
+<file path=ppt/slides/slide18.xml><?xml version="1.0" encoding="utf-8"?>
+<p:sld xmlns:a="http://schemas.openxmlformats.org/drawingml/2006/main" xmlns:r="http://schemas.openxmlformats.org/officeDocument/2006/relationships" xmlns:p="http://schemas.openxmlformats.org/presentationml/2006/main">
+  <p:cSld>
+    <p:bg>
+      <p:bgPr>
+        <a:solidFill>
+          <a:schemeClr val="bg2"/>
+        </a:solidFill>
+        <a:effectLst/>
+      </p:bgPr>
+    </p:bg>
+    <p:spTree>
+      <p:nvGrpSpPr>
+        <p:cNvPr id="1" name=""/>
+        <p:cNvGrpSpPr/>
+        <p:nvPr/>
+      </p:nvGrpSpPr>
+      <p:grpSpPr>
+        <a:xfrm>
+          <a:off x="0" y="0"/>
+          <a:ext cx="0" cy="0"/>
+          <a:chOff x="0" y="0"/>
+          <a:chExt cx="0" cy="0"/>
+        </a:xfrm>
+      </p:grpSpPr>
+      <p:sp>
+        <p:nvSpPr>
+          <p:cNvPr id="17" name="Rectangle 16">
+            <a:extLst>
+              <a:ext uri="{FF2B5EF4-FFF2-40B4-BE49-F238E27FC236}">
+                <a16:creationId xmlns:a16="http://schemas.microsoft.com/office/drawing/2014/main" id="{A6F05DDE-5F2C-44F5-BACC-DED4737B11B8}"/>
+              </a:ext>
+              <a:ext uri="{C183D7F6-B498-43B3-948B-1728B52AA6E4}">
+                <adec:decorative xmlns:adec="http://schemas.microsoft.com/office/drawing/2017/decorative" val="1"/>
+              </a:ext>
+            </a:extLst>
+          </p:cNvPr>
+          <p:cNvSpPr>
+            <a:spLocks noGrp="1" noRot="1" noChangeAspect="1" noMove="1" noResize="1" noEditPoints="1" noAdjustHandles="1" noChangeArrowheads="1" noChangeShapeType="1" noTextEdit="1"/>
+          </p:cNvSpPr>
+          <p:nvPr>
+            <p:extLst>
+              <p:ext uri="{386F3935-93C4-4BCD-93E2-E3B085C9AB24}">
+                <p16:designElem xmlns:p16="http://schemas.microsoft.com/office/powerpoint/2015/main" val="1"/>
+              </p:ext>
+            </p:extLst>
+          </p:nvPr>
+        </p:nvSpPr>
+        <p:spPr>
+          <a:xfrm>
+            <a:off x="0" y="0"/>
+            <a:ext cx="457200" cy="6858000"/>
+          </a:xfrm>
+          <a:prstGeom prst="rect">
+            <a:avLst/>
+          </a:prstGeom>
+          <a:solidFill>
+            <a:schemeClr val="accent1"/>
+          </a:solidFill>
+          <a:ln>
+            <a:noFill/>
+          </a:ln>
+        </p:spPr>
+        <p:style>
+          <a:lnRef idx="2">
+            <a:schemeClr val="accent1">
+              <a:shade val="50000"/>
+            </a:schemeClr>
+          </a:lnRef>
+          <a:fillRef idx="1">
+            <a:schemeClr val="accent1"/>
+          </a:fillRef>
+          <a:effectRef idx="0">
+            <a:schemeClr val="accent1"/>
+          </a:effectRef>
+          <a:fontRef idx="minor">
+            <a:schemeClr val="lt1"/>
+          </a:fontRef>
+        </p:style>
+      </p:sp>
+      <p:sp useBgFill="1">
+        <p:nvSpPr>
+          <p:cNvPr id="19" name="Rectangle 18">
+            <a:extLst>
+              <a:ext uri="{FF2B5EF4-FFF2-40B4-BE49-F238E27FC236}">
+                <a16:creationId xmlns:a16="http://schemas.microsoft.com/office/drawing/2014/main" id="{B6BC6A0D-8979-47FF-B606-70528EF8E548}"/>
+              </a:ext>
+              <a:ext uri="{C183D7F6-B498-43B3-948B-1728B52AA6E4}">
+                <adec:decorative xmlns:adec="http://schemas.microsoft.com/office/drawing/2017/decorative" val="1"/>
+              </a:ext>
+            </a:extLst>
+          </p:cNvPr>
+          <p:cNvSpPr>
+            <a:spLocks noGrp="1" noRot="1" noChangeAspect="1" noMove="1" noResize="1" noEditPoints="1" noAdjustHandles="1" noChangeArrowheads="1" noChangeShapeType="1" noTextEdit="1"/>
+          </p:cNvSpPr>
+          <p:nvPr>
+            <p:extLst>
+              <p:ext uri="{386F3935-93C4-4BCD-93E2-E3B085C9AB24}">
+                <p16:designElem xmlns:p16="http://schemas.microsoft.com/office/powerpoint/2015/main" val="1"/>
+              </p:ext>
+            </p:extLst>
+          </p:nvPr>
+        </p:nvSpPr>
+        <p:spPr>
+          <a:xfrm>
+            <a:off x="0" y="0"/>
+            <a:ext cx="12192000" cy="6858000"/>
+          </a:xfrm>
+          <a:prstGeom prst="rect">
+            <a:avLst/>
+          </a:prstGeom>
+          <a:ln>
+            <a:noFill/>
+          </a:ln>
+        </p:spPr>
+        <p:style>
+          <a:lnRef idx="2">
+            <a:schemeClr val="accent1">
+              <a:shade val="50000"/>
+            </a:schemeClr>
+          </a:lnRef>
+          <a:fillRef idx="1">
+            <a:schemeClr val="accent1"/>
+          </a:fillRef>
+          <a:effectRef idx="0">
+            <a:schemeClr val="accent1"/>
+          </a:effectRef>
+          <a:fontRef idx="minor">
+            <a:schemeClr val="lt1"/>
+          </a:fontRef>
+        </p:style>
+        <p:txBody>
+          <a:bodyPr rtlCol="0" anchor="ctr"/>
+          <a:lstStyle/>
+          <a:p>
+            <a:pPr algn="ctr"/>
+            <a:endParaRPr lang="en-US"/>
+          </a:p>
+        </p:txBody>
+      </p:sp>
+      <p:sp>
+        <p:nvSpPr>
+          <p:cNvPr id="2" name="Title 1">
+            <a:extLst>
+              <a:ext uri="{FF2B5EF4-FFF2-40B4-BE49-F238E27FC236}">
+                <a16:creationId xmlns:a16="http://schemas.microsoft.com/office/drawing/2014/main" id="{8365F3F6-B96A-6D96-06E4-C7575ADEC10D}"/>
+              </a:ext>
+            </a:extLst>
+          </p:cNvPr>
+          <p:cNvSpPr>
+            <a:spLocks noGrp="1"/>
+          </p:cNvSpPr>
+          <p:nvPr>
+            <p:ph type="title"/>
+          </p:nvPr>
+        </p:nvSpPr>
+        <p:spPr>
+          <a:xfrm>
+            <a:off x="457200" y="0"/>
+            <a:ext cx="10669424" cy="789762"/>
+          </a:xfrm>
+        </p:spPr>
+        <p:txBody>
+          <a:bodyPr vert="horz" lIns="91440" tIns="45720" rIns="91440" bIns="45720" rtlCol="0" anchor="b">
+            <a:normAutofit/>
+          </a:bodyPr>
+          <a:lstStyle/>
+          <a:p>
+            <a:pPr>
+              <a:lnSpc>
+                <a:spcPct val="85000"/>
+              </a:lnSpc>
+            </a:pPr>
+            <a:r>
               <a:rPr lang="en-US" sz="3200" dirty="0" err="1">
                 <a:latin typeface="Segoe UI" panose="020B0502040204020203" pitchFamily="34" charset="0"/>
                 <a:cs typeface="Segoe UI" panose="020B0502040204020203" pitchFamily="34" charset="0"/>
@@ -11155,7 +11577,7 @@
 </p:sld>
 </file>
 
-<file path=ppt/slides/slide18.xml><?xml version="1.0" encoding="utf-8"?>
+<file path=ppt/slides/slide19.xml><?xml version="1.0" encoding="utf-8"?>
 <p:sld xmlns:a="http://schemas.openxmlformats.org/drawingml/2006/main" xmlns:r="http://schemas.openxmlformats.org/officeDocument/2006/relationships" xmlns:p="http://schemas.openxmlformats.org/presentationml/2006/main">
   <p:cSld>
     <p:spTree>
@@ -11223,7 +11645,7 @@
 </p:sld>
 </file>
 
-<file path=ppt/slides/slide19.xml><?xml version="1.0" encoding="utf-8"?>
+<file path=ppt/slides/slide2.xml><?xml version="1.0" encoding="utf-8"?>
 <p:sld xmlns:a="http://schemas.openxmlformats.org/drawingml/2006/main" xmlns:r="http://schemas.openxmlformats.org/officeDocument/2006/relationships" xmlns:p="http://schemas.openxmlformats.org/presentationml/2006/main">
   <p:cSld>
     <p:bg>
@@ -11382,6 +11804,451 @@
         <p:spPr>
           <a:xfrm>
             <a:off x="457200" y="0"/>
+            <a:ext cx="9056876" cy="789762"/>
+          </a:xfrm>
+        </p:spPr>
+        <p:txBody>
+          <a:bodyPr vert="horz" lIns="91440" tIns="45720" rIns="91440" bIns="45720" rtlCol="0" anchor="b">
+            <a:normAutofit/>
+          </a:bodyPr>
+          <a:lstStyle/>
+          <a:p>
+            <a:pPr>
+              <a:lnSpc>
+                <a:spcPct val="85000"/>
+              </a:lnSpc>
+            </a:pPr>
+            <a:r>
+              <a:rPr lang="en-US" sz="3200" dirty="0">
+                <a:latin typeface="Segoe UI" panose="020B0502040204020203" pitchFamily="34" charset="0"/>
+                <a:cs typeface="Segoe UI" panose="020B0502040204020203" pitchFamily="34" charset="0"/>
+              </a:rPr>
+              <a:t>Agenda</a:t>
+            </a:r>
+          </a:p>
+        </p:txBody>
+      </p:sp>
+      <p:sp>
+        <p:nvSpPr>
+          <p:cNvPr id="21" name="Rectangle 20">
+            <a:extLst>
+              <a:ext uri="{FF2B5EF4-FFF2-40B4-BE49-F238E27FC236}">
+                <a16:creationId xmlns:a16="http://schemas.microsoft.com/office/drawing/2014/main" id="{3B92CCBF-1641-4D35-9B74-6E4981730FF5}"/>
+              </a:ext>
+              <a:ext uri="{C183D7F6-B498-43B3-948B-1728B52AA6E4}">
+                <adec:decorative xmlns:adec="http://schemas.microsoft.com/office/drawing/2017/decorative" val="1"/>
+              </a:ext>
+            </a:extLst>
+          </p:cNvPr>
+          <p:cNvSpPr>
+            <a:spLocks noGrp="1" noRot="1" noChangeAspect="1" noMove="1" noResize="1" noEditPoints="1" noAdjustHandles="1" noChangeArrowheads="1" noChangeShapeType="1" noTextEdit="1"/>
+          </p:cNvSpPr>
+          <p:nvPr>
+            <p:extLst>
+              <p:ext uri="{386F3935-93C4-4BCD-93E2-E3B085C9AB24}">
+                <p16:designElem xmlns:p16="http://schemas.microsoft.com/office/powerpoint/2015/main" val="1"/>
+              </p:ext>
+            </p:extLst>
+          </p:nvPr>
+        </p:nvSpPr>
+        <p:spPr>
+          <a:xfrm>
+            <a:off x="0" y="0"/>
+            <a:ext cx="457200" cy="6858000"/>
+          </a:xfrm>
+          <a:prstGeom prst="rect">
+            <a:avLst/>
+          </a:prstGeom>
+          <a:solidFill>
+            <a:schemeClr val="accent1"/>
+          </a:solidFill>
+          <a:ln>
+            <a:noFill/>
+          </a:ln>
+        </p:spPr>
+        <p:style>
+          <a:lnRef idx="2">
+            <a:schemeClr val="accent1">
+              <a:shade val="50000"/>
+            </a:schemeClr>
+          </a:lnRef>
+          <a:fillRef idx="1">
+            <a:schemeClr val="accent1"/>
+          </a:fillRef>
+          <a:effectRef idx="0">
+            <a:schemeClr val="accent1"/>
+          </a:effectRef>
+          <a:fontRef idx="minor">
+            <a:schemeClr val="lt1"/>
+          </a:fontRef>
+        </p:style>
+      </p:sp>
+      <p:sp>
+        <p:nvSpPr>
+          <p:cNvPr id="4" name="TextBox 3">
+            <a:extLst>
+              <a:ext uri="{FF2B5EF4-FFF2-40B4-BE49-F238E27FC236}">
+                <a16:creationId xmlns:a16="http://schemas.microsoft.com/office/drawing/2014/main" id="{9A02F332-785F-EDF3-2612-485CA3E27A61}"/>
+              </a:ext>
+            </a:extLst>
+          </p:cNvPr>
+          <p:cNvSpPr txBox="1"/>
+          <p:nvPr/>
+        </p:nvSpPr>
+        <p:spPr>
+          <a:xfrm>
+            <a:off x="457200" y="1079157"/>
+            <a:ext cx="9304638" cy="4395755"/>
+          </a:xfrm>
+          <a:prstGeom prst="rect">
+            <a:avLst/>
+          </a:prstGeom>
+          <a:noFill/>
+        </p:spPr>
+        <p:txBody>
+          <a:bodyPr wrap="square" rtlCol="0">
+            <a:spAutoFit/>
+          </a:bodyPr>
+          <a:lstStyle/>
+          <a:p>
+            <a:pPr marL="342900" indent="-342900">
+              <a:lnSpc>
+                <a:spcPct val="150000"/>
+              </a:lnSpc>
+              <a:spcAft>
+                <a:spcPts val="600"/>
+              </a:spcAft>
+              <a:buFont typeface="+mj-lt"/>
+              <a:buAutoNum type="arabicPeriod"/>
+            </a:pPr>
+            <a:r>
+              <a:rPr lang="en-US" dirty="0">
+                <a:latin typeface="Segoe UI" panose="020B0502040204020203" pitchFamily="34" charset="0"/>
+                <a:cs typeface="Segoe UI" panose="020B0502040204020203" pitchFamily="34" charset="0"/>
+              </a:rPr>
+              <a:t>Objective of this presentation</a:t>
+            </a:r>
+          </a:p>
+          <a:p>
+            <a:pPr marL="342900" indent="-342900">
+              <a:lnSpc>
+                <a:spcPct val="150000"/>
+              </a:lnSpc>
+              <a:spcAft>
+                <a:spcPts val="600"/>
+              </a:spcAft>
+              <a:buFont typeface="+mj-lt"/>
+              <a:buAutoNum type="arabicPeriod"/>
+            </a:pPr>
+            <a:r>
+              <a:rPr lang="en-US" dirty="0">
+                <a:latin typeface="Segoe UI" panose="020B0502040204020203" pitchFamily="34" charset="0"/>
+                <a:cs typeface="Segoe UI" panose="020B0502040204020203" pitchFamily="34" charset="0"/>
+              </a:rPr>
+              <a:t>The RL environment</a:t>
+            </a:r>
+          </a:p>
+          <a:p>
+            <a:pPr marL="342900" indent="-342900">
+              <a:lnSpc>
+                <a:spcPct val="150000"/>
+              </a:lnSpc>
+              <a:spcAft>
+                <a:spcPts val="600"/>
+              </a:spcAft>
+              <a:buFont typeface="+mj-lt"/>
+              <a:buAutoNum type="arabicPeriod"/>
+            </a:pPr>
+            <a:r>
+              <a:rPr lang="en-US" dirty="0">
+                <a:latin typeface="Segoe UI" panose="020B0502040204020203" pitchFamily="34" charset="0"/>
+                <a:cs typeface="Segoe UI" panose="020B0502040204020203" pitchFamily="34" charset="0"/>
+              </a:rPr>
+              <a:t>Evaluation strategy</a:t>
+            </a:r>
+          </a:p>
+          <a:p>
+            <a:pPr marL="342900" indent="-342900">
+              <a:lnSpc>
+                <a:spcPct val="150000"/>
+              </a:lnSpc>
+              <a:spcAft>
+                <a:spcPts val="600"/>
+              </a:spcAft>
+              <a:buFont typeface="+mj-lt"/>
+              <a:buAutoNum type="arabicPeriod"/>
+            </a:pPr>
+            <a:r>
+              <a:rPr lang="en-US" dirty="0">
+                <a:latin typeface="Segoe UI" panose="020B0502040204020203" pitchFamily="34" charset="0"/>
+                <a:cs typeface="Segoe UI" panose="020B0502040204020203" pitchFamily="34" charset="0"/>
+              </a:rPr>
+              <a:t>Findings</a:t>
+            </a:r>
+          </a:p>
+          <a:p>
+            <a:pPr marL="342900" indent="-342900">
+              <a:lnSpc>
+                <a:spcPct val="150000"/>
+              </a:lnSpc>
+              <a:spcAft>
+                <a:spcPts val="600"/>
+              </a:spcAft>
+              <a:buFont typeface="+mj-lt"/>
+              <a:buAutoNum type="arabicPeriod"/>
+            </a:pPr>
+            <a:r>
+              <a:rPr lang="en-US" i="1" dirty="0">
+                <a:solidFill>
+                  <a:srgbClr val="C00000"/>
+                </a:solidFill>
+                <a:latin typeface="Segoe UI" panose="020B0502040204020203" pitchFamily="34" charset="0"/>
+                <a:cs typeface="Segoe UI" panose="020B0502040204020203" pitchFamily="34" charset="0"/>
+              </a:rPr>
+              <a:t>What could I possibly be doing wrong?</a:t>
+            </a:r>
+          </a:p>
+          <a:p>
+            <a:pPr marL="342900" indent="-342900">
+              <a:lnSpc>
+                <a:spcPct val="150000"/>
+              </a:lnSpc>
+              <a:spcAft>
+                <a:spcPts val="600"/>
+              </a:spcAft>
+              <a:buFont typeface="+mj-lt"/>
+              <a:buAutoNum type="arabicPeriod"/>
+            </a:pPr>
+            <a:r>
+              <a:rPr lang="en-US" dirty="0">
+                <a:latin typeface="Segoe UI" panose="020B0502040204020203" pitchFamily="34" charset="0"/>
+                <a:cs typeface="Segoe UI" panose="020B0502040204020203" pitchFamily="34" charset="0"/>
+              </a:rPr>
+              <a:t>Discussion</a:t>
+            </a:r>
+          </a:p>
+          <a:p>
+            <a:pPr marL="342900" indent="-342900">
+              <a:lnSpc>
+                <a:spcPct val="150000"/>
+              </a:lnSpc>
+              <a:spcAft>
+                <a:spcPts val="600"/>
+              </a:spcAft>
+              <a:buFont typeface="+mj-lt"/>
+              <a:buAutoNum type="arabicPeriod"/>
+            </a:pPr>
+            <a:endParaRPr lang="en-US" dirty="0">
+              <a:latin typeface="Segoe UI" panose="020B0502040204020203" pitchFamily="34" charset="0"/>
+              <a:cs typeface="Segoe UI" panose="020B0502040204020203" pitchFamily="34" charset="0"/>
+            </a:endParaRPr>
+          </a:p>
+          <a:p>
+            <a:pPr marL="342900" indent="-342900">
+              <a:lnSpc>
+                <a:spcPct val="150000"/>
+              </a:lnSpc>
+              <a:spcAft>
+                <a:spcPts val="600"/>
+              </a:spcAft>
+              <a:buFont typeface="+mj-lt"/>
+              <a:buAutoNum type="arabicPeriod"/>
+            </a:pPr>
+            <a:endParaRPr lang="en-US" dirty="0">
+              <a:latin typeface="Segoe UI" panose="020B0502040204020203" pitchFamily="34" charset="0"/>
+              <a:cs typeface="Segoe UI" panose="020B0502040204020203" pitchFamily="34" charset="0"/>
+            </a:endParaRPr>
+          </a:p>
+          <a:p>
+            <a:pPr marL="285750" indent="-285750">
+              <a:lnSpc>
+                <a:spcPct val="150000"/>
+              </a:lnSpc>
+              <a:spcAft>
+                <a:spcPts val="600"/>
+              </a:spcAft>
+              <a:buFontTx/>
+              <a:buChar char="-"/>
+            </a:pPr>
+            <a:endParaRPr lang="en-US" dirty="0">
+              <a:latin typeface="Segoe UI" panose="020B0502040204020203" pitchFamily="34" charset="0"/>
+              <a:cs typeface="Segoe UI" panose="020B0502040204020203" pitchFamily="34" charset="0"/>
+            </a:endParaRPr>
+          </a:p>
+        </p:txBody>
+      </p:sp>
+    </p:spTree>
+    <p:extLst>
+      <p:ext uri="{BB962C8B-B14F-4D97-AF65-F5344CB8AC3E}">
+        <p14:creationId xmlns:p14="http://schemas.microsoft.com/office/powerpoint/2010/main" val="1145405783"/>
+      </p:ext>
+    </p:extLst>
+  </p:cSld>
+  <p:clrMapOvr>
+    <a:masterClrMapping/>
+  </p:clrMapOvr>
+</p:sld>
+</file>
+
+<file path=ppt/slides/slide20.xml><?xml version="1.0" encoding="utf-8"?>
+<p:sld xmlns:a="http://schemas.openxmlformats.org/drawingml/2006/main" xmlns:r="http://schemas.openxmlformats.org/officeDocument/2006/relationships" xmlns:p="http://schemas.openxmlformats.org/presentationml/2006/main">
+  <p:cSld>
+    <p:bg>
+      <p:bgPr>
+        <a:solidFill>
+          <a:schemeClr val="bg2"/>
+        </a:solidFill>
+        <a:effectLst/>
+      </p:bgPr>
+    </p:bg>
+    <p:spTree>
+      <p:nvGrpSpPr>
+        <p:cNvPr id="1" name=""/>
+        <p:cNvGrpSpPr/>
+        <p:nvPr/>
+      </p:nvGrpSpPr>
+      <p:grpSpPr>
+        <a:xfrm>
+          <a:off x="0" y="0"/>
+          <a:ext cx="0" cy="0"/>
+          <a:chOff x="0" y="0"/>
+          <a:chExt cx="0" cy="0"/>
+        </a:xfrm>
+      </p:grpSpPr>
+      <p:sp>
+        <p:nvSpPr>
+          <p:cNvPr id="17" name="Rectangle 16">
+            <a:extLst>
+              <a:ext uri="{FF2B5EF4-FFF2-40B4-BE49-F238E27FC236}">
+                <a16:creationId xmlns:a16="http://schemas.microsoft.com/office/drawing/2014/main" id="{A6F05DDE-5F2C-44F5-BACC-DED4737B11B8}"/>
+              </a:ext>
+              <a:ext uri="{C183D7F6-B498-43B3-948B-1728B52AA6E4}">
+                <adec:decorative xmlns:adec="http://schemas.microsoft.com/office/drawing/2017/decorative" val="1"/>
+              </a:ext>
+            </a:extLst>
+          </p:cNvPr>
+          <p:cNvSpPr>
+            <a:spLocks noGrp="1" noRot="1" noChangeAspect="1" noMove="1" noResize="1" noEditPoints="1" noAdjustHandles="1" noChangeArrowheads="1" noChangeShapeType="1" noTextEdit="1"/>
+          </p:cNvSpPr>
+          <p:nvPr>
+            <p:extLst>
+              <p:ext uri="{386F3935-93C4-4BCD-93E2-E3B085C9AB24}">
+                <p16:designElem xmlns:p16="http://schemas.microsoft.com/office/powerpoint/2015/main" val="1"/>
+              </p:ext>
+            </p:extLst>
+          </p:nvPr>
+        </p:nvSpPr>
+        <p:spPr>
+          <a:xfrm>
+            <a:off x="0" y="0"/>
+            <a:ext cx="457200" cy="6858000"/>
+          </a:xfrm>
+          <a:prstGeom prst="rect">
+            <a:avLst/>
+          </a:prstGeom>
+          <a:solidFill>
+            <a:schemeClr val="accent1"/>
+          </a:solidFill>
+          <a:ln>
+            <a:noFill/>
+          </a:ln>
+        </p:spPr>
+        <p:style>
+          <a:lnRef idx="2">
+            <a:schemeClr val="accent1">
+              <a:shade val="50000"/>
+            </a:schemeClr>
+          </a:lnRef>
+          <a:fillRef idx="1">
+            <a:schemeClr val="accent1"/>
+          </a:fillRef>
+          <a:effectRef idx="0">
+            <a:schemeClr val="accent1"/>
+          </a:effectRef>
+          <a:fontRef idx="minor">
+            <a:schemeClr val="lt1"/>
+          </a:fontRef>
+        </p:style>
+      </p:sp>
+      <p:sp useBgFill="1">
+        <p:nvSpPr>
+          <p:cNvPr id="19" name="Rectangle 18">
+            <a:extLst>
+              <a:ext uri="{FF2B5EF4-FFF2-40B4-BE49-F238E27FC236}">
+                <a16:creationId xmlns:a16="http://schemas.microsoft.com/office/drawing/2014/main" id="{B6BC6A0D-8979-47FF-B606-70528EF8E548}"/>
+              </a:ext>
+              <a:ext uri="{C183D7F6-B498-43B3-948B-1728B52AA6E4}">
+                <adec:decorative xmlns:adec="http://schemas.microsoft.com/office/drawing/2017/decorative" val="1"/>
+              </a:ext>
+            </a:extLst>
+          </p:cNvPr>
+          <p:cNvSpPr>
+            <a:spLocks noGrp="1" noRot="1" noChangeAspect="1" noMove="1" noResize="1" noEditPoints="1" noAdjustHandles="1" noChangeArrowheads="1" noChangeShapeType="1" noTextEdit="1"/>
+          </p:cNvSpPr>
+          <p:nvPr>
+            <p:extLst>
+              <p:ext uri="{386F3935-93C4-4BCD-93E2-E3B085C9AB24}">
+                <p16:designElem xmlns:p16="http://schemas.microsoft.com/office/powerpoint/2015/main" val="1"/>
+              </p:ext>
+            </p:extLst>
+          </p:nvPr>
+        </p:nvSpPr>
+        <p:spPr>
+          <a:xfrm>
+            <a:off x="0" y="0"/>
+            <a:ext cx="12192000" cy="6858000"/>
+          </a:xfrm>
+          <a:prstGeom prst="rect">
+            <a:avLst/>
+          </a:prstGeom>
+          <a:ln>
+            <a:noFill/>
+          </a:ln>
+        </p:spPr>
+        <p:style>
+          <a:lnRef idx="2">
+            <a:schemeClr val="accent1">
+              <a:shade val="50000"/>
+            </a:schemeClr>
+          </a:lnRef>
+          <a:fillRef idx="1">
+            <a:schemeClr val="accent1"/>
+          </a:fillRef>
+          <a:effectRef idx="0">
+            <a:schemeClr val="accent1"/>
+          </a:effectRef>
+          <a:fontRef idx="minor">
+            <a:schemeClr val="lt1"/>
+          </a:fontRef>
+        </p:style>
+        <p:txBody>
+          <a:bodyPr rtlCol="0" anchor="ctr"/>
+          <a:lstStyle/>
+          <a:p>
+            <a:pPr algn="ctr"/>
+            <a:endParaRPr lang="en-US"/>
+          </a:p>
+        </p:txBody>
+      </p:sp>
+      <p:sp>
+        <p:nvSpPr>
+          <p:cNvPr id="2" name="Title 1">
+            <a:extLst>
+              <a:ext uri="{FF2B5EF4-FFF2-40B4-BE49-F238E27FC236}">
+                <a16:creationId xmlns:a16="http://schemas.microsoft.com/office/drawing/2014/main" id="{8365F3F6-B96A-6D96-06E4-C7575ADEC10D}"/>
+              </a:ext>
+            </a:extLst>
+          </p:cNvPr>
+          <p:cNvSpPr>
+            <a:spLocks noGrp="1"/>
+          </p:cNvSpPr>
+          <p:nvPr>
+            <p:ph type="title"/>
+          </p:nvPr>
+        </p:nvSpPr>
+        <p:spPr>
+          <a:xfrm>
+            <a:off x="457200" y="0"/>
             <a:ext cx="10669424" cy="789762"/>
           </a:xfrm>
         </p:spPr>
@@ -11626,7 +12493,7 @@
 </p:sld>
 </file>
 
-<file path=ppt/slides/slide2.xml><?xml version="1.0" encoding="utf-8"?>
+<file path=ppt/slides/slide21.xml><?xml version="1.0" encoding="utf-8"?>
 <p:sld xmlns:a="http://schemas.openxmlformats.org/drawingml/2006/main" xmlns:r="http://schemas.openxmlformats.org/officeDocument/2006/relationships" xmlns:p="http://schemas.openxmlformats.org/presentationml/2006/main">
   <p:cSld>
     <p:bg>
@@ -11785,7 +12652,7 @@
         <p:spPr>
           <a:xfrm>
             <a:off x="457200" y="0"/>
-            <a:ext cx="9056876" cy="789762"/>
+            <a:ext cx="10669424" cy="789762"/>
           </a:xfrm>
         </p:spPr>
         <p:txBody>
@@ -11804,7 +12671,7 @@
                 <a:latin typeface="Segoe UI" panose="020B0502040204020203" pitchFamily="34" charset="0"/>
                 <a:cs typeface="Segoe UI" panose="020B0502040204020203" pitchFamily="34" charset="0"/>
               </a:rPr>
-              <a:t>Agenda</a:t>
+              <a:t>Results: SB-3 (10 K episodes)</a:t>
             </a:r>
           </a:p>
         </p:txBody>
@@ -11864,12 +12731,42 @@
           </a:fontRef>
         </p:style>
       </p:sp>
+      <p:pic>
+        <p:nvPicPr>
+          <p:cNvPr id="7" name="Picture 6">
+            <a:extLst>
+              <a:ext uri="{FF2B5EF4-FFF2-40B4-BE49-F238E27FC236}">
+                <a16:creationId xmlns:a16="http://schemas.microsoft.com/office/drawing/2014/main" id="{3AB951BF-01E4-74F7-C1C4-A5F56B51DDD8}"/>
+              </a:ext>
+            </a:extLst>
+          </p:cNvPr>
+          <p:cNvPicPr>
+            <a:picLocks noChangeAspect="1"/>
+          </p:cNvPicPr>
+          <p:nvPr/>
+        </p:nvPicPr>
+        <p:blipFill>
+          <a:blip r:embed="rId2"/>
+          <a:stretch>
+            <a:fillRect/>
+          </a:stretch>
+        </p:blipFill>
+        <p:spPr>
+          <a:xfrm>
+            <a:off x="506000" y="1219200"/>
+            <a:ext cx="11637199" cy="4689080"/>
+          </a:xfrm>
+          <a:prstGeom prst="rect">
+            <a:avLst/>
+          </a:prstGeom>
+        </p:spPr>
+      </p:pic>
       <p:sp>
         <p:nvSpPr>
-          <p:cNvPr id="4" name="TextBox 3">
+          <p:cNvPr id="8" name="TextBox 7">
             <a:extLst>
               <a:ext uri="{FF2B5EF4-FFF2-40B4-BE49-F238E27FC236}">
-                <a16:creationId xmlns:a16="http://schemas.microsoft.com/office/drawing/2014/main" id="{9A02F332-785F-EDF3-2612-485CA3E27A61}"/>
+                <a16:creationId xmlns:a16="http://schemas.microsoft.com/office/drawing/2014/main" id="{605B02E5-8E6F-7803-5071-76AC4469CA2B}"/>
               </a:ext>
             </a:extLst>
           </p:cNvPr>
@@ -11878,8 +12775,8 @@
         </p:nvSpPr>
         <p:spPr>
           <a:xfrm>
-            <a:off x="457200" y="1079157"/>
-            <a:ext cx="9304638" cy="4395755"/>
+            <a:off x="457200" y="6155032"/>
+            <a:ext cx="11637199" cy="456215"/>
           </a:xfrm>
           <a:prstGeom prst="rect">
             <a:avLst/>
@@ -11887,171 +12784,45 @@
           <a:noFill/>
         </p:spPr>
         <p:txBody>
-          <a:bodyPr wrap="square" rtlCol="0">
+          <a:bodyPr wrap="square">
             <a:spAutoFit/>
           </a:bodyPr>
           <a:lstStyle/>
           <a:p>
-            <a:pPr marL="342900" indent="-342900">
+            <a:pPr>
               <a:lnSpc>
                 <a:spcPct val="150000"/>
               </a:lnSpc>
-              <a:spcAft>
-                <a:spcPts val="600"/>
-              </a:spcAft>
-              <a:buFont typeface="+mj-lt"/>
-              <a:buAutoNum type="arabicPeriod"/>
             </a:pPr>
             <a:r>
               <a:rPr lang="en-US" dirty="0">
                 <a:latin typeface="Segoe UI" panose="020B0502040204020203" pitchFamily="34" charset="0"/>
                 <a:cs typeface="Segoe UI" panose="020B0502040204020203" pitchFamily="34" charset="0"/>
               </a:rPr>
-              <a:t>Objective of this presentation</a:t>
-            </a:r>
-          </a:p>
-          <a:p>
-            <a:pPr marL="342900" indent="-342900">
-              <a:lnSpc>
-                <a:spcPct val="150000"/>
-              </a:lnSpc>
-              <a:spcAft>
-                <a:spcPts val="600"/>
-              </a:spcAft>
-              <a:buFont typeface="+mj-lt"/>
-              <a:buAutoNum type="arabicPeriod"/>
-            </a:pPr>
+              <a:t>SB-3 algorithms do perform well sometimes </a:t>
+            </a:r>
+            <a:r>
+              <a:rPr lang="en-US" i="1" dirty="0">
+                <a:latin typeface="Segoe UI" panose="020B0502040204020203" pitchFamily="34" charset="0"/>
+                <a:cs typeface="Segoe UI" panose="020B0502040204020203" pitchFamily="34" charset="0"/>
+              </a:rPr>
+              <a:t>(green)</a:t>
+            </a:r>
             <a:r>
               <a:rPr lang="en-US" dirty="0">
                 <a:latin typeface="Segoe UI" panose="020B0502040204020203" pitchFamily="34" charset="0"/>
                 <a:cs typeface="Segoe UI" panose="020B0502040204020203" pitchFamily="34" charset="0"/>
               </a:rPr>
-              <a:t>The RL environment</a:t>
-            </a:r>
-          </a:p>
-          <a:p>
-            <a:pPr marL="342900" indent="-342900">
-              <a:lnSpc>
-                <a:spcPct val="150000"/>
-              </a:lnSpc>
-              <a:spcAft>
-                <a:spcPts val="600"/>
-              </a:spcAft>
-              <a:buFont typeface="+mj-lt"/>
-              <a:buAutoNum type="arabicPeriod"/>
-            </a:pPr>
-            <a:r>
-              <a:rPr lang="en-US" dirty="0">
+              <a:t>. On an average their performance is poor </a:t>
+            </a:r>
+            <a:r>
+              <a:rPr lang="en-US" i="1" dirty="0">
                 <a:latin typeface="Segoe UI" panose="020B0502040204020203" pitchFamily="34" charset="0"/>
                 <a:cs typeface="Segoe UI" panose="020B0502040204020203" pitchFamily="34" charset="0"/>
               </a:rPr>
-              <a:t>Evaluation strategy</a:t>
-            </a:r>
-          </a:p>
-          <a:p>
-            <a:pPr marL="342900" indent="-342900">
-              <a:lnSpc>
-                <a:spcPct val="150000"/>
-              </a:lnSpc>
-              <a:spcAft>
-                <a:spcPts val="600"/>
-              </a:spcAft>
-              <a:buFont typeface="+mj-lt"/>
-              <a:buAutoNum type="arabicPeriod"/>
-            </a:pPr>
-            <a:r>
-              <a:rPr lang="en-US" dirty="0">
-                <a:latin typeface="Segoe UI" panose="020B0502040204020203" pitchFamily="34" charset="0"/>
-                <a:cs typeface="Segoe UI" panose="020B0502040204020203" pitchFamily="34" charset="0"/>
-              </a:rPr>
-              <a:t>Findings</a:t>
-            </a:r>
-          </a:p>
-          <a:p>
-            <a:pPr marL="342900" indent="-342900">
-              <a:lnSpc>
-                <a:spcPct val="150000"/>
-              </a:lnSpc>
-              <a:spcAft>
-                <a:spcPts val="600"/>
-              </a:spcAft>
-              <a:buFont typeface="+mj-lt"/>
-              <a:buAutoNum type="arabicPeriod"/>
-            </a:pPr>
-            <a:r>
-              <a:rPr lang="en-US" i="1" dirty="0">
-                <a:solidFill>
-                  <a:srgbClr val="C00000"/>
-                </a:solidFill>
-                <a:latin typeface="Segoe UI" panose="020B0502040204020203" pitchFamily="34" charset="0"/>
-                <a:cs typeface="Segoe UI" panose="020B0502040204020203" pitchFamily="34" charset="0"/>
-              </a:rPr>
-              <a:t>What could I possibly be doing wrong?</a:t>
-            </a:r>
-          </a:p>
-          <a:p>
-            <a:pPr marL="342900" indent="-342900">
-              <a:lnSpc>
-                <a:spcPct val="150000"/>
-              </a:lnSpc>
-              <a:spcAft>
-                <a:spcPts val="600"/>
-              </a:spcAft>
-              <a:buFont typeface="+mj-lt"/>
-              <a:buAutoNum type="arabicPeriod"/>
-            </a:pPr>
-            <a:r>
-              <a:rPr lang="en-US" dirty="0">
-                <a:latin typeface="Segoe UI" panose="020B0502040204020203" pitchFamily="34" charset="0"/>
-                <a:cs typeface="Segoe UI" panose="020B0502040204020203" pitchFamily="34" charset="0"/>
-              </a:rPr>
-              <a:t>Discussion</a:t>
-            </a:r>
-          </a:p>
-          <a:p>
-            <a:pPr marL="342900" indent="-342900">
-              <a:lnSpc>
-                <a:spcPct val="150000"/>
-              </a:lnSpc>
-              <a:spcAft>
-                <a:spcPts val="600"/>
-              </a:spcAft>
-              <a:buFont typeface="+mj-lt"/>
-              <a:buAutoNum type="arabicPeriod"/>
-            </a:pPr>
-            <a:endParaRPr lang="en-US" dirty="0">
-              <a:latin typeface="Segoe UI" panose="020B0502040204020203" pitchFamily="34" charset="0"/>
-              <a:cs typeface="Segoe UI" panose="020B0502040204020203" pitchFamily="34" charset="0"/>
-            </a:endParaRPr>
-          </a:p>
-          <a:p>
-            <a:pPr marL="342900" indent="-342900">
-              <a:lnSpc>
-                <a:spcPct val="150000"/>
-              </a:lnSpc>
-              <a:spcAft>
-                <a:spcPts val="600"/>
-              </a:spcAft>
-              <a:buFont typeface="+mj-lt"/>
-              <a:buAutoNum type="arabicPeriod"/>
-            </a:pPr>
-            <a:endParaRPr lang="en-US" dirty="0">
-              <a:latin typeface="Segoe UI" panose="020B0502040204020203" pitchFamily="34" charset="0"/>
-              <a:cs typeface="Segoe UI" panose="020B0502040204020203" pitchFamily="34" charset="0"/>
-            </a:endParaRPr>
-          </a:p>
-          <a:p>
-            <a:pPr marL="285750" indent="-285750">
-              <a:lnSpc>
-                <a:spcPct val="150000"/>
-              </a:lnSpc>
-              <a:spcAft>
-                <a:spcPts val="600"/>
-              </a:spcAft>
-              <a:buFontTx/>
-              <a:buChar char="-"/>
-            </a:pPr>
-            <a:endParaRPr lang="en-US" dirty="0">
+              <a:t>(red-orange-yellow).</a:t>
+            </a:r>
+            <a:endParaRPr lang="en-US" sz="1600" i="1" dirty="0">
               <a:latin typeface="Segoe UI" panose="020B0502040204020203" pitchFamily="34" charset="0"/>
               <a:cs typeface="Segoe UI" panose="020B0502040204020203" pitchFamily="34" charset="0"/>
             </a:endParaRPr>
@@ -12061,7 +12832,7 @@
     </p:spTree>
     <p:extLst>
       <p:ext uri="{BB962C8B-B14F-4D97-AF65-F5344CB8AC3E}">
-        <p14:creationId xmlns:p14="http://schemas.microsoft.com/office/powerpoint/2010/main" val="1145405783"/>
+        <p14:creationId xmlns:p14="http://schemas.microsoft.com/office/powerpoint/2010/main" val="2487336572"/>
       </p:ext>
     </p:extLst>
   </p:cSld>
@@ -12071,7 +12842,7 @@
 </p:sld>
 </file>
 
-<file path=ppt/slides/slide20.xml><?xml version="1.0" encoding="utf-8"?>
+<file path=ppt/slides/slide22.xml><?xml version="1.0" encoding="utf-8"?>
 <p:sld xmlns:a="http://schemas.openxmlformats.org/drawingml/2006/main" xmlns:r="http://schemas.openxmlformats.org/officeDocument/2006/relationships" xmlns:p="http://schemas.openxmlformats.org/presentationml/2006/main">
   <p:cSld>
     <p:bg>
@@ -12249,355 +13020,6 @@
                 <a:latin typeface="Segoe UI" panose="020B0502040204020203" pitchFamily="34" charset="0"/>
                 <a:cs typeface="Segoe UI" panose="020B0502040204020203" pitchFamily="34" charset="0"/>
               </a:rPr>
-              <a:t>Results: SB-3 (10 K episodes)</a:t>
-            </a:r>
-          </a:p>
-        </p:txBody>
-      </p:sp>
-      <p:sp>
-        <p:nvSpPr>
-          <p:cNvPr id="21" name="Rectangle 20">
-            <a:extLst>
-              <a:ext uri="{FF2B5EF4-FFF2-40B4-BE49-F238E27FC236}">
-                <a16:creationId xmlns:a16="http://schemas.microsoft.com/office/drawing/2014/main" id="{3B92CCBF-1641-4D35-9B74-6E4981730FF5}"/>
-              </a:ext>
-              <a:ext uri="{C183D7F6-B498-43B3-948B-1728B52AA6E4}">
-                <adec:decorative xmlns:adec="http://schemas.microsoft.com/office/drawing/2017/decorative" val="1"/>
-              </a:ext>
-            </a:extLst>
-          </p:cNvPr>
-          <p:cNvSpPr>
-            <a:spLocks noGrp="1" noRot="1" noChangeAspect="1" noMove="1" noResize="1" noEditPoints="1" noAdjustHandles="1" noChangeArrowheads="1" noChangeShapeType="1" noTextEdit="1"/>
-          </p:cNvSpPr>
-          <p:nvPr>
-            <p:extLst>
-              <p:ext uri="{386F3935-93C4-4BCD-93E2-E3B085C9AB24}">
-                <p16:designElem xmlns:p16="http://schemas.microsoft.com/office/powerpoint/2015/main" val="1"/>
-              </p:ext>
-            </p:extLst>
-          </p:nvPr>
-        </p:nvSpPr>
-        <p:spPr>
-          <a:xfrm>
-            <a:off x="0" y="0"/>
-            <a:ext cx="457200" cy="6858000"/>
-          </a:xfrm>
-          <a:prstGeom prst="rect">
-            <a:avLst/>
-          </a:prstGeom>
-          <a:solidFill>
-            <a:schemeClr val="accent1"/>
-          </a:solidFill>
-          <a:ln>
-            <a:noFill/>
-          </a:ln>
-        </p:spPr>
-        <p:style>
-          <a:lnRef idx="2">
-            <a:schemeClr val="accent1">
-              <a:shade val="50000"/>
-            </a:schemeClr>
-          </a:lnRef>
-          <a:fillRef idx="1">
-            <a:schemeClr val="accent1"/>
-          </a:fillRef>
-          <a:effectRef idx="0">
-            <a:schemeClr val="accent1"/>
-          </a:effectRef>
-          <a:fontRef idx="minor">
-            <a:schemeClr val="lt1"/>
-          </a:fontRef>
-        </p:style>
-      </p:sp>
-      <p:pic>
-        <p:nvPicPr>
-          <p:cNvPr id="7" name="Picture 6">
-            <a:extLst>
-              <a:ext uri="{FF2B5EF4-FFF2-40B4-BE49-F238E27FC236}">
-                <a16:creationId xmlns:a16="http://schemas.microsoft.com/office/drawing/2014/main" id="{3AB951BF-01E4-74F7-C1C4-A5F56B51DDD8}"/>
-              </a:ext>
-            </a:extLst>
-          </p:cNvPr>
-          <p:cNvPicPr>
-            <a:picLocks noChangeAspect="1"/>
-          </p:cNvPicPr>
-          <p:nvPr/>
-        </p:nvPicPr>
-        <p:blipFill>
-          <a:blip r:embed="rId2"/>
-          <a:stretch>
-            <a:fillRect/>
-          </a:stretch>
-        </p:blipFill>
-        <p:spPr>
-          <a:xfrm>
-            <a:off x="506000" y="1219200"/>
-            <a:ext cx="11637199" cy="4689080"/>
-          </a:xfrm>
-          <a:prstGeom prst="rect">
-            <a:avLst/>
-          </a:prstGeom>
-        </p:spPr>
-      </p:pic>
-      <p:sp>
-        <p:nvSpPr>
-          <p:cNvPr id="8" name="TextBox 7">
-            <a:extLst>
-              <a:ext uri="{FF2B5EF4-FFF2-40B4-BE49-F238E27FC236}">
-                <a16:creationId xmlns:a16="http://schemas.microsoft.com/office/drawing/2014/main" id="{605B02E5-8E6F-7803-5071-76AC4469CA2B}"/>
-              </a:ext>
-            </a:extLst>
-          </p:cNvPr>
-          <p:cNvSpPr txBox="1"/>
-          <p:nvPr/>
-        </p:nvSpPr>
-        <p:spPr>
-          <a:xfrm>
-            <a:off x="457200" y="6155032"/>
-            <a:ext cx="11637199" cy="456215"/>
-          </a:xfrm>
-          <a:prstGeom prst="rect">
-            <a:avLst/>
-          </a:prstGeom>
-          <a:noFill/>
-        </p:spPr>
-        <p:txBody>
-          <a:bodyPr wrap="square">
-            <a:spAutoFit/>
-          </a:bodyPr>
-          <a:lstStyle/>
-          <a:p>
-            <a:pPr>
-              <a:lnSpc>
-                <a:spcPct val="150000"/>
-              </a:lnSpc>
-            </a:pPr>
-            <a:r>
-              <a:rPr lang="en-US" dirty="0">
-                <a:latin typeface="Segoe UI" panose="020B0502040204020203" pitchFamily="34" charset="0"/>
-                <a:cs typeface="Segoe UI" panose="020B0502040204020203" pitchFamily="34" charset="0"/>
-              </a:rPr>
-              <a:t>SB-3 algorithms do perform well sometimes </a:t>
-            </a:r>
-            <a:r>
-              <a:rPr lang="en-US" i="1" dirty="0">
-                <a:latin typeface="Segoe UI" panose="020B0502040204020203" pitchFamily="34" charset="0"/>
-                <a:cs typeface="Segoe UI" panose="020B0502040204020203" pitchFamily="34" charset="0"/>
-              </a:rPr>
-              <a:t>(green)</a:t>
-            </a:r>
-            <a:r>
-              <a:rPr lang="en-US" dirty="0">
-                <a:latin typeface="Segoe UI" panose="020B0502040204020203" pitchFamily="34" charset="0"/>
-                <a:cs typeface="Segoe UI" panose="020B0502040204020203" pitchFamily="34" charset="0"/>
-              </a:rPr>
-              <a:t>. On an average their performance is poor </a:t>
-            </a:r>
-            <a:r>
-              <a:rPr lang="en-US" i="1" dirty="0">
-                <a:latin typeface="Segoe UI" panose="020B0502040204020203" pitchFamily="34" charset="0"/>
-                <a:cs typeface="Segoe UI" panose="020B0502040204020203" pitchFamily="34" charset="0"/>
-              </a:rPr>
-              <a:t>(red-orange-yellow).</a:t>
-            </a:r>
-            <a:endParaRPr lang="en-US" sz="1600" i="1" dirty="0">
-              <a:latin typeface="Segoe UI" panose="020B0502040204020203" pitchFamily="34" charset="0"/>
-              <a:cs typeface="Segoe UI" panose="020B0502040204020203" pitchFamily="34" charset="0"/>
-            </a:endParaRPr>
-          </a:p>
-        </p:txBody>
-      </p:sp>
-    </p:spTree>
-    <p:extLst>
-      <p:ext uri="{BB962C8B-B14F-4D97-AF65-F5344CB8AC3E}">
-        <p14:creationId xmlns:p14="http://schemas.microsoft.com/office/powerpoint/2010/main" val="2487336572"/>
-      </p:ext>
-    </p:extLst>
-  </p:cSld>
-  <p:clrMapOvr>
-    <a:masterClrMapping/>
-  </p:clrMapOvr>
-</p:sld>
-</file>
-
-<file path=ppt/slides/slide21.xml><?xml version="1.0" encoding="utf-8"?>
-<p:sld xmlns:a="http://schemas.openxmlformats.org/drawingml/2006/main" xmlns:r="http://schemas.openxmlformats.org/officeDocument/2006/relationships" xmlns:p="http://schemas.openxmlformats.org/presentationml/2006/main">
-  <p:cSld>
-    <p:bg>
-      <p:bgPr>
-        <a:solidFill>
-          <a:schemeClr val="bg2"/>
-        </a:solidFill>
-        <a:effectLst/>
-      </p:bgPr>
-    </p:bg>
-    <p:spTree>
-      <p:nvGrpSpPr>
-        <p:cNvPr id="1" name=""/>
-        <p:cNvGrpSpPr/>
-        <p:nvPr/>
-      </p:nvGrpSpPr>
-      <p:grpSpPr>
-        <a:xfrm>
-          <a:off x="0" y="0"/>
-          <a:ext cx="0" cy="0"/>
-          <a:chOff x="0" y="0"/>
-          <a:chExt cx="0" cy="0"/>
-        </a:xfrm>
-      </p:grpSpPr>
-      <p:sp>
-        <p:nvSpPr>
-          <p:cNvPr id="17" name="Rectangle 16">
-            <a:extLst>
-              <a:ext uri="{FF2B5EF4-FFF2-40B4-BE49-F238E27FC236}">
-                <a16:creationId xmlns:a16="http://schemas.microsoft.com/office/drawing/2014/main" id="{A6F05DDE-5F2C-44F5-BACC-DED4737B11B8}"/>
-              </a:ext>
-              <a:ext uri="{C183D7F6-B498-43B3-948B-1728B52AA6E4}">
-                <adec:decorative xmlns:adec="http://schemas.microsoft.com/office/drawing/2017/decorative" val="1"/>
-              </a:ext>
-            </a:extLst>
-          </p:cNvPr>
-          <p:cNvSpPr>
-            <a:spLocks noGrp="1" noRot="1" noChangeAspect="1" noMove="1" noResize="1" noEditPoints="1" noAdjustHandles="1" noChangeArrowheads="1" noChangeShapeType="1" noTextEdit="1"/>
-          </p:cNvSpPr>
-          <p:nvPr>
-            <p:extLst>
-              <p:ext uri="{386F3935-93C4-4BCD-93E2-E3B085C9AB24}">
-                <p16:designElem xmlns:p16="http://schemas.microsoft.com/office/powerpoint/2015/main" val="1"/>
-              </p:ext>
-            </p:extLst>
-          </p:nvPr>
-        </p:nvSpPr>
-        <p:spPr>
-          <a:xfrm>
-            <a:off x="0" y="0"/>
-            <a:ext cx="457200" cy="6858000"/>
-          </a:xfrm>
-          <a:prstGeom prst="rect">
-            <a:avLst/>
-          </a:prstGeom>
-          <a:solidFill>
-            <a:schemeClr val="accent1"/>
-          </a:solidFill>
-          <a:ln>
-            <a:noFill/>
-          </a:ln>
-        </p:spPr>
-        <p:style>
-          <a:lnRef idx="2">
-            <a:schemeClr val="accent1">
-              <a:shade val="50000"/>
-            </a:schemeClr>
-          </a:lnRef>
-          <a:fillRef idx="1">
-            <a:schemeClr val="accent1"/>
-          </a:fillRef>
-          <a:effectRef idx="0">
-            <a:schemeClr val="accent1"/>
-          </a:effectRef>
-          <a:fontRef idx="minor">
-            <a:schemeClr val="lt1"/>
-          </a:fontRef>
-        </p:style>
-      </p:sp>
-      <p:sp useBgFill="1">
-        <p:nvSpPr>
-          <p:cNvPr id="19" name="Rectangle 18">
-            <a:extLst>
-              <a:ext uri="{FF2B5EF4-FFF2-40B4-BE49-F238E27FC236}">
-                <a16:creationId xmlns:a16="http://schemas.microsoft.com/office/drawing/2014/main" id="{B6BC6A0D-8979-47FF-B606-70528EF8E548}"/>
-              </a:ext>
-              <a:ext uri="{C183D7F6-B498-43B3-948B-1728B52AA6E4}">
-                <adec:decorative xmlns:adec="http://schemas.microsoft.com/office/drawing/2017/decorative" val="1"/>
-              </a:ext>
-            </a:extLst>
-          </p:cNvPr>
-          <p:cNvSpPr>
-            <a:spLocks noGrp="1" noRot="1" noChangeAspect="1" noMove="1" noResize="1" noEditPoints="1" noAdjustHandles="1" noChangeArrowheads="1" noChangeShapeType="1" noTextEdit="1"/>
-          </p:cNvSpPr>
-          <p:nvPr>
-            <p:extLst>
-              <p:ext uri="{386F3935-93C4-4BCD-93E2-E3B085C9AB24}">
-                <p16:designElem xmlns:p16="http://schemas.microsoft.com/office/powerpoint/2015/main" val="1"/>
-              </p:ext>
-            </p:extLst>
-          </p:nvPr>
-        </p:nvSpPr>
-        <p:spPr>
-          <a:xfrm>
-            <a:off x="0" y="0"/>
-            <a:ext cx="12192000" cy="6858000"/>
-          </a:xfrm>
-          <a:prstGeom prst="rect">
-            <a:avLst/>
-          </a:prstGeom>
-          <a:ln>
-            <a:noFill/>
-          </a:ln>
-        </p:spPr>
-        <p:style>
-          <a:lnRef idx="2">
-            <a:schemeClr val="accent1">
-              <a:shade val="50000"/>
-            </a:schemeClr>
-          </a:lnRef>
-          <a:fillRef idx="1">
-            <a:schemeClr val="accent1"/>
-          </a:fillRef>
-          <a:effectRef idx="0">
-            <a:schemeClr val="accent1"/>
-          </a:effectRef>
-          <a:fontRef idx="minor">
-            <a:schemeClr val="lt1"/>
-          </a:fontRef>
-        </p:style>
-        <p:txBody>
-          <a:bodyPr rtlCol="0" anchor="ctr"/>
-          <a:lstStyle/>
-          <a:p>
-            <a:pPr algn="ctr"/>
-            <a:endParaRPr lang="en-US"/>
-          </a:p>
-        </p:txBody>
-      </p:sp>
-      <p:sp>
-        <p:nvSpPr>
-          <p:cNvPr id="2" name="Title 1">
-            <a:extLst>
-              <a:ext uri="{FF2B5EF4-FFF2-40B4-BE49-F238E27FC236}">
-                <a16:creationId xmlns:a16="http://schemas.microsoft.com/office/drawing/2014/main" id="{8365F3F6-B96A-6D96-06E4-C7575ADEC10D}"/>
-              </a:ext>
-            </a:extLst>
-          </p:cNvPr>
-          <p:cNvSpPr>
-            <a:spLocks noGrp="1"/>
-          </p:cNvSpPr>
-          <p:nvPr>
-            <p:ph type="title"/>
-          </p:nvPr>
-        </p:nvSpPr>
-        <p:spPr>
-          <a:xfrm>
-            <a:off x="457200" y="0"/>
-            <a:ext cx="10669424" cy="789762"/>
-          </a:xfrm>
-        </p:spPr>
-        <p:txBody>
-          <a:bodyPr vert="horz" lIns="91440" tIns="45720" rIns="91440" bIns="45720" rtlCol="0" anchor="b">
-            <a:normAutofit/>
-          </a:bodyPr>
-          <a:lstStyle/>
-          <a:p>
-            <a:pPr>
-              <a:lnSpc>
-                <a:spcPct val="85000"/>
-              </a:lnSpc>
-            </a:pPr>
-            <a:r>
-              <a:rPr lang="en-US" sz="3200" dirty="0">
-                <a:latin typeface="Segoe UI" panose="020B0502040204020203" pitchFamily="34" charset="0"/>
-                <a:cs typeface="Segoe UI" panose="020B0502040204020203" pitchFamily="34" charset="0"/>
-              </a:rPr>
               <a:t>Results: SB-3 (20 K episodes)</a:t>
             </a:r>
           </a:p>
@@ -12769,7 +13191,7 @@
 </p:sld>
 </file>
 
-<file path=ppt/slides/slide22.xml><?xml version="1.0" encoding="utf-8"?>
+<file path=ppt/slides/slide23.xml><?xml version="1.0" encoding="utf-8"?>
 <p:sld xmlns:a="http://schemas.openxmlformats.org/drawingml/2006/main" xmlns:r="http://schemas.openxmlformats.org/officeDocument/2006/relationships" xmlns:p="http://schemas.openxmlformats.org/presentationml/2006/main">
   <p:cSld>
     <p:bg>
@@ -12845,7 +13267,7 @@
 </p:sld>
 </file>
 
-<file path=ppt/slides/slide23.xml><?xml version="1.0" encoding="utf-8"?>
+<file path=ppt/slides/slide24.xml><?xml version="1.0" encoding="utf-8"?>
 <p:sld xmlns:a="http://schemas.openxmlformats.org/drawingml/2006/main" xmlns:r="http://schemas.openxmlformats.org/officeDocument/2006/relationships" xmlns:p="http://schemas.openxmlformats.org/presentationml/2006/main">
   <p:cSld>
     <p:bg>

</xml_diff>